<commit_message>
Számítás fixálás és ppt update
</commit_message>
<xml_diff>
--- a/DIN-PTT.pptx
+++ b/DIN-PTT.pptx
@@ -344,7 +344,7 @@
           <a:p>
             <a:fld id="{129950DD-C43F-43A6-A0D6-586CE2C100B3}" type="datetimeFigureOut">
               <a:rPr lang="hu-HU" smtClean="0"/>
-              <a:t>2026. 01. 21.</a:t>
+              <a:t>2026. 01. 22.</a:t>
             </a:fld>
             <a:endParaRPr lang="hu-HU"/>
           </a:p>
@@ -552,7 +552,7 @@
           <a:p>
             <a:fld id="{129950DD-C43F-43A6-A0D6-586CE2C100B3}" type="datetimeFigureOut">
               <a:rPr lang="hu-HU" smtClean="0"/>
-              <a:t>2026. 01. 21.</a:t>
+              <a:t>2026. 01. 22.</a:t>
             </a:fld>
             <a:endParaRPr lang="hu-HU"/>
           </a:p>
@@ -808,7 +808,7 @@
           <a:p>
             <a:fld id="{129950DD-C43F-43A6-A0D6-586CE2C100B3}" type="datetimeFigureOut">
               <a:rPr lang="hu-HU" smtClean="0"/>
-              <a:t>2026. 01. 21.</a:t>
+              <a:t>2026. 01. 22.</a:t>
             </a:fld>
             <a:endParaRPr lang="hu-HU"/>
           </a:p>
@@ -982,7 +982,7 @@
           <a:p>
             <a:fld id="{129950DD-C43F-43A6-A0D6-586CE2C100B3}" type="datetimeFigureOut">
               <a:rPr lang="hu-HU" smtClean="0"/>
-              <a:t>2026. 01. 21.</a:t>
+              <a:t>2026. 01. 22.</a:t>
             </a:fld>
             <a:endParaRPr lang="hu-HU"/>
           </a:p>
@@ -1325,7 +1325,7 @@
           <a:p>
             <a:fld id="{129950DD-C43F-43A6-A0D6-586CE2C100B3}" type="datetimeFigureOut">
               <a:rPr lang="hu-HU" smtClean="0"/>
-              <a:t>2026. 01. 21.</a:t>
+              <a:t>2026. 01. 22.</a:t>
             </a:fld>
             <a:endParaRPr lang="hu-HU"/>
           </a:p>
@@ -1600,7 +1600,7 @@
           <a:p>
             <a:fld id="{129950DD-C43F-43A6-A0D6-586CE2C100B3}" type="datetimeFigureOut">
               <a:rPr lang="hu-HU" smtClean="0"/>
-              <a:t>2026. 01. 21.</a:t>
+              <a:t>2026. 01. 22.</a:t>
             </a:fld>
             <a:endParaRPr lang="hu-HU"/>
           </a:p>
@@ -1979,7 +1979,7 @@
           <a:p>
             <a:fld id="{129950DD-C43F-43A6-A0D6-586CE2C100B3}" type="datetimeFigureOut">
               <a:rPr lang="hu-HU" smtClean="0"/>
-              <a:t>2026. 01. 21.</a:t>
+              <a:t>2026. 01. 22.</a:t>
             </a:fld>
             <a:endParaRPr lang="hu-HU"/>
           </a:p>
@@ -2097,7 +2097,7 @@
           <a:p>
             <a:fld id="{129950DD-C43F-43A6-A0D6-586CE2C100B3}" type="datetimeFigureOut">
               <a:rPr lang="hu-HU" smtClean="0"/>
-              <a:t>2026. 01. 21.</a:t>
+              <a:t>2026. 01. 22.</a:t>
             </a:fld>
             <a:endParaRPr lang="hu-HU"/>
           </a:p>
@@ -2268,7 +2268,7 @@
           <a:p>
             <a:fld id="{129950DD-C43F-43A6-A0D6-586CE2C100B3}" type="datetimeFigureOut">
               <a:rPr lang="hu-HU" smtClean="0"/>
-              <a:t>2026. 01. 21.</a:t>
+              <a:t>2026. 01. 22.</a:t>
             </a:fld>
             <a:endParaRPr lang="hu-HU"/>
           </a:p>
@@ -2622,7 +2622,7 @@
           <a:p>
             <a:fld id="{129950DD-C43F-43A6-A0D6-586CE2C100B3}" type="datetimeFigureOut">
               <a:rPr lang="hu-HU" smtClean="0"/>
-              <a:t>2026. 01. 21.</a:t>
+              <a:t>2026. 01. 22.</a:t>
             </a:fld>
             <a:endParaRPr lang="hu-HU"/>
           </a:p>
@@ -3004,7 +3004,7 @@
           <a:p>
             <a:fld id="{129950DD-C43F-43A6-A0D6-586CE2C100B3}" type="datetimeFigureOut">
               <a:rPr lang="hu-HU" smtClean="0"/>
-              <a:t>2026. 01. 21.</a:t>
+              <a:t>2026. 01. 22.</a:t>
             </a:fld>
             <a:endParaRPr lang="hu-HU"/>
           </a:p>
@@ -3291,7 +3291,7 @@
           <a:p>
             <a:fld id="{129950DD-C43F-43A6-A0D6-586CE2C100B3}" type="datetimeFigureOut">
               <a:rPr lang="hu-HU" smtClean="0"/>
-              <a:t>2026. 01. 21.</a:t>
+              <a:t>2026. 01. 22.</a:t>
             </a:fld>
             <a:endParaRPr lang="hu-HU"/>
           </a:p>
@@ -4231,6 +4231,42 @@
           </a:prstGeom>
         </p:spPr>
       </p:pic>
+      <p:pic>
+        <p:nvPicPr>
+          <p:cNvPr id="9" name="Kép 8">
+            <a:extLst>
+              <a:ext uri="{FF2B5EF4-FFF2-40B4-BE49-F238E27FC236}">
+                <a16:creationId xmlns:a16="http://schemas.microsoft.com/office/drawing/2014/main" id="{FA4988D9-298D-4F60-B6D3-35C582E0AFBE}"/>
+              </a:ext>
+            </a:extLst>
+          </p:cNvPr>
+          <p:cNvPicPr>
+            <a:picLocks noChangeAspect="1"/>
+          </p:cNvPicPr>
+          <p:nvPr/>
+        </p:nvPicPr>
+        <p:blipFill>
+          <a:blip r:embed="rId4">
+            <a:extLst>
+              <a:ext uri="{28A0092B-C50C-407E-A947-70E740481C1C}">
+                <a14:useLocalDpi xmlns:a14="http://schemas.microsoft.com/office/drawing/2010/main" val="0"/>
+              </a:ext>
+            </a:extLst>
+          </a:blip>
+          <a:stretch>
+            <a:fillRect/>
+          </a:stretch>
+        </p:blipFill>
+        <p:spPr>
+          <a:xfrm>
+            <a:off x="10167205" y="5717913"/>
+            <a:ext cx="2024795" cy="1140087"/>
+          </a:xfrm>
+          <a:prstGeom prst="rect">
+            <a:avLst/>
+          </a:prstGeom>
+        </p:spPr>
+      </p:pic>
     </p:spTree>
     <p:extLst>
       <p:ext uri="{BB962C8B-B14F-4D97-AF65-F5344CB8AC3E}">
@@ -4466,6 +4502,42 @@
           <a:xfrm>
             <a:off x="5554353" y="4000479"/>
             <a:ext cx="2693281" cy="2408110"/>
+          </a:xfrm>
+          <a:prstGeom prst="rect">
+            <a:avLst/>
+          </a:prstGeom>
+        </p:spPr>
+      </p:pic>
+      <p:pic>
+        <p:nvPicPr>
+          <p:cNvPr id="9" name="Kép 8">
+            <a:extLst>
+              <a:ext uri="{FF2B5EF4-FFF2-40B4-BE49-F238E27FC236}">
+                <a16:creationId xmlns:a16="http://schemas.microsoft.com/office/drawing/2014/main" id="{14834300-2CC2-4262-9A90-9346C9F44899}"/>
+              </a:ext>
+            </a:extLst>
+          </p:cNvPr>
+          <p:cNvPicPr>
+            <a:picLocks noChangeAspect="1"/>
+          </p:cNvPicPr>
+          <p:nvPr/>
+        </p:nvPicPr>
+        <p:blipFill>
+          <a:blip r:embed="rId4">
+            <a:extLst>
+              <a:ext uri="{28A0092B-C50C-407E-A947-70E740481C1C}">
+                <a14:useLocalDpi xmlns:a14="http://schemas.microsoft.com/office/drawing/2010/main" val="0"/>
+              </a:ext>
+            </a:extLst>
+          </a:blip>
+          <a:stretch>
+            <a:fillRect/>
+          </a:stretch>
+        </p:blipFill>
+        <p:spPr>
+          <a:xfrm>
+            <a:off x="10890902" y="5334190"/>
+            <a:ext cx="1534071" cy="1523810"/>
           </a:xfrm>
           <a:prstGeom prst="rect">
             <a:avLst/>
@@ -4711,6 +4783,42 @@
           </a:prstGeom>
         </p:spPr>
       </p:pic>
+      <p:pic>
+        <p:nvPicPr>
+          <p:cNvPr id="8" name="Kép 7">
+            <a:extLst>
+              <a:ext uri="{FF2B5EF4-FFF2-40B4-BE49-F238E27FC236}">
+                <a16:creationId xmlns:a16="http://schemas.microsoft.com/office/drawing/2014/main" id="{0B0A6EA8-7D16-4610-B1B8-D573F6990477}"/>
+              </a:ext>
+            </a:extLst>
+          </p:cNvPr>
+          <p:cNvPicPr>
+            <a:picLocks noChangeAspect="1"/>
+          </p:cNvPicPr>
+          <p:nvPr/>
+        </p:nvPicPr>
+        <p:blipFill>
+          <a:blip r:embed="rId4">
+            <a:extLst>
+              <a:ext uri="{28A0092B-C50C-407E-A947-70E740481C1C}">
+                <a14:useLocalDpi xmlns:a14="http://schemas.microsoft.com/office/drawing/2010/main" val="0"/>
+              </a:ext>
+            </a:extLst>
+          </a:blip>
+          <a:stretch>
+            <a:fillRect/>
+          </a:stretch>
+        </p:blipFill>
+        <p:spPr>
+          <a:xfrm flipH="1">
+            <a:off x="10789086" y="4924142"/>
+            <a:ext cx="1402914" cy="1933858"/>
+          </a:xfrm>
+          <a:prstGeom prst="rect">
+            <a:avLst/>
+          </a:prstGeom>
+        </p:spPr>
+      </p:pic>
     </p:spTree>
     <p:extLst>
       <p:ext uri="{BB962C8B-B14F-4D97-AF65-F5344CB8AC3E}">
@@ -4931,8 +5039,44 @@
         </p:blipFill>
         <p:spPr>
           <a:xfrm>
-            <a:off x="7505602" y="4168732"/>
-            <a:ext cx="4397746" cy="2220893"/>
+            <a:off x="7425703" y="3945802"/>
+            <a:ext cx="3573730" cy="1804759"/>
+          </a:xfrm>
+          <a:prstGeom prst="rect">
+            <a:avLst/>
+          </a:prstGeom>
+        </p:spPr>
+      </p:pic>
+      <p:pic>
+        <p:nvPicPr>
+          <p:cNvPr id="5" name="Kép 4">
+            <a:extLst>
+              <a:ext uri="{FF2B5EF4-FFF2-40B4-BE49-F238E27FC236}">
+                <a16:creationId xmlns:a16="http://schemas.microsoft.com/office/drawing/2014/main" id="{65C4C6EA-67AC-47D6-A61C-5E97F4329BB0}"/>
+              </a:ext>
+            </a:extLst>
+          </p:cNvPr>
+          <p:cNvPicPr>
+            <a:picLocks noChangeAspect="1"/>
+          </p:cNvPicPr>
+          <p:nvPr/>
+        </p:nvPicPr>
+        <p:blipFill>
+          <a:blip r:embed="rId4">
+            <a:extLst>
+              <a:ext uri="{28A0092B-C50C-407E-A947-70E740481C1C}">
+                <a14:useLocalDpi xmlns:a14="http://schemas.microsoft.com/office/drawing/2010/main" val="0"/>
+              </a:ext>
+            </a:extLst>
+          </a:blip>
+          <a:stretch>
+            <a:fillRect/>
+          </a:stretch>
+        </p:blipFill>
+        <p:spPr>
+          <a:xfrm>
+            <a:off x="10804743" y="5473066"/>
+            <a:ext cx="1387257" cy="1387257"/>
           </a:xfrm>
           <a:prstGeom prst="rect">
             <a:avLst/>
@@ -5163,6 +5307,42 @@
           </a:p>
         </p:txBody>
       </p:sp>
+      <p:pic>
+        <p:nvPicPr>
+          <p:cNvPr id="5" name="Kép 4">
+            <a:extLst>
+              <a:ext uri="{FF2B5EF4-FFF2-40B4-BE49-F238E27FC236}">
+                <a16:creationId xmlns:a16="http://schemas.microsoft.com/office/drawing/2014/main" id="{8609C22A-756E-4E27-9D4A-FC4B38A5FD61}"/>
+              </a:ext>
+            </a:extLst>
+          </p:cNvPr>
+          <p:cNvPicPr>
+            <a:picLocks noChangeAspect="1"/>
+          </p:cNvPicPr>
+          <p:nvPr/>
+        </p:nvPicPr>
+        <p:blipFill>
+          <a:blip r:embed="rId2">
+            <a:extLst>
+              <a:ext uri="{28A0092B-C50C-407E-A947-70E740481C1C}">
+                <a14:useLocalDpi xmlns:a14="http://schemas.microsoft.com/office/drawing/2010/main" val="0"/>
+              </a:ext>
+            </a:extLst>
+          </a:blip>
+          <a:stretch>
+            <a:fillRect/>
+          </a:stretch>
+        </p:blipFill>
+        <p:spPr>
+          <a:xfrm>
+            <a:off x="10550557" y="5026964"/>
+            <a:ext cx="1904816" cy="1901007"/>
+          </a:xfrm>
+          <a:prstGeom prst="rect">
+            <a:avLst/>
+          </a:prstGeom>
+        </p:spPr>
+      </p:pic>
     </p:spTree>
     <p:extLst>
       <p:ext uri="{BB962C8B-B14F-4D97-AF65-F5344CB8AC3E}">
@@ -5297,6 +5477,42 @@
           <a:ln>
             <a:noFill/>
           </a:ln>
+        </p:spPr>
+      </p:pic>
+      <p:pic>
+        <p:nvPicPr>
+          <p:cNvPr id="7" name="Kép 6">
+            <a:extLst>
+              <a:ext uri="{FF2B5EF4-FFF2-40B4-BE49-F238E27FC236}">
+                <a16:creationId xmlns:a16="http://schemas.microsoft.com/office/drawing/2014/main" id="{E4E9E284-D7CF-4B79-9090-341E8F5A3F79}"/>
+              </a:ext>
+            </a:extLst>
+          </p:cNvPr>
+          <p:cNvPicPr>
+            <a:picLocks noChangeAspect="1"/>
+          </p:cNvPicPr>
+          <p:nvPr/>
+        </p:nvPicPr>
+        <p:blipFill>
+          <a:blip r:embed="rId3">
+            <a:extLst>
+              <a:ext uri="{28A0092B-C50C-407E-A947-70E740481C1C}">
+                <a14:useLocalDpi xmlns:a14="http://schemas.microsoft.com/office/drawing/2010/main" val="0"/>
+              </a:ext>
+            </a:extLst>
+          </a:blip>
+          <a:stretch>
+            <a:fillRect/>
+          </a:stretch>
+        </p:blipFill>
+        <p:spPr>
+          <a:xfrm>
+            <a:off x="10910333" y="5028876"/>
+            <a:ext cx="1829124" cy="1829124"/>
+          </a:xfrm>
+          <a:prstGeom prst="rect">
+            <a:avLst/>
+          </a:prstGeom>
         </p:spPr>
       </p:pic>
     </p:spTree>

</xml_diff>